<commit_message>
fixed write error ;)
Signed-off-by: DoMoDo <dw@cabtronix.ch>
</commit_message>
<xml_diff>
--- a/Bash-scripting-crime-statistic.pptx
+++ b/Bash-scripting-crime-statistic.pptx
@@ -5196,34 +5196,42 @@
             </a:r>
             <a:r>
               <a:rPr lang="de-CH" dirty="0"/>
-              <a:t> </a:t>
+              <a:t> of </a:t>
             </a:r>
             <a:r>
               <a:rPr lang="de-CH" dirty="0" err="1"/>
-              <a:t>of</a:t>
+              <a:t>cat</a:t>
             </a:r>
             <a:r>
               <a:rPr lang="de-CH" dirty="0"/>
               <a:t> </a:t>
             </a:r>
             <a:r>
-              <a:rPr lang="de-CH" dirty="0" err="1"/>
-              <a:t>cat</a:t>
+              <a:rPr lang="de-CH" dirty="0">
+                <a:latin typeface="Consolas" panose="020B0609020204030204" pitchFamily="49" charset="0"/>
+              </a:rPr>
+              <a:t>-&gt;</a:t>
             </a:r>
             <a:r>
               <a:rPr lang="de-CH" dirty="0"/>
-              <a:t> -&gt; </a:t>
-            </a:r>
-            <a:r>
-              <a:rPr lang="fr-FR" dirty="0"/>
+              <a:t> </a:t>
+            </a:r>
+            <a:r>
+              <a:rPr lang="fr-FR" dirty="0">
+                <a:latin typeface="Consolas" panose="020B0609020204030204" pitchFamily="49" charset="0"/>
+              </a:rPr>
               <a:t>cat crime.csv | </a:t>
             </a:r>
             <a:r>
-              <a:rPr lang="fr-FR" dirty="0" err="1"/>
+              <a:rPr lang="fr-FR" dirty="0" err="1">
+                <a:latin typeface="Consolas" panose="020B0609020204030204" pitchFamily="49" charset="0"/>
+              </a:rPr>
               <a:t>wc</a:t>
             </a:r>
             <a:r>
-              <a:rPr lang="fr-FR" dirty="0"/>
+              <a:rPr lang="fr-FR" dirty="0">
+                <a:latin typeface="Consolas" panose="020B0609020204030204" pitchFamily="49" charset="0"/>
+              </a:rPr>
               <a:t> –l -&gt; </a:t>
             </a:r>
             <a:r>
@@ -5235,11 +5243,15 @@
               <a:t>: </a:t>
             </a:r>
             <a:r>
-              <a:rPr lang="de-CH" dirty="0" err="1"/>
+              <a:rPr lang="de-CH" dirty="0" err="1">
+                <a:latin typeface="Consolas" panose="020B0609020204030204" pitchFamily="49" charset="0"/>
+              </a:rPr>
               <a:t>wc</a:t>
             </a:r>
             <a:r>
-              <a:rPr lang="de-CH" dirty="0"/>
+              <a:rPr lang="de-CH" dirty="0">
+                <a:latin typeface="Consolas" panose="020B0609020204030204" pitchFamily="49" charset="0"/>
+              </a:rPr>
               <a:t> -l &lt; crime.csv</a:t>
             </a:r>
           </a:p>

</xml_diff>